<commit_message>
Progress Update/20221025_Progress Update.pptx modified
</commit_message>
<xml_diff>
--- a/Progress Update/20221025_Progress Update.pptx
+++ b/Progress Update/20221025_Progress Update.pptx
@@ -274,7 +274,7 @@
           <a:p>
             <a:fld id="{AA62E360-6C95-4DBF-899A-1E55FFF5B26F}" type="datetimeFigureOut">
               <a:rPr lang="ko-KR" altLang="en-US" smtClean="0"/>
-              <a:t>2022-10-25</a:t>
+              <a:t>2022-11-01</a:t>
             </a:fld>
             <a:endParaRPr lang="ko-KR" altLang="en-US"/>
           </a:p>
@@ -472,7 +472,7 @@
           <a:p>
             <a:fld id="{AA62E360-6C95-4DBF-899A-1E55FFF5B26F}" type="datetimeFigureOut">
               <a:rPr lang="ko-KR" altLang="en-US" smtClean="0"/>
-              <a:t>2022-10-25</a:t>
+              <a:t>2022-11-01</a:t>
             </a:fld>
             <a:endParaRPr lang="ko-KR" altLang="en-US"/>
           </a:p>
@@ -680,7 +680,7 @@
           <a:p>
             <a:fld id="{AA62E360-6C95-4DBF-899A-1E55FFF5B26F}" type="datetimeFigureOut">
               <a:rPr lang="ko-KR" altLang="en-US" smtClean="0"/>
-              <a:t>2022-10-25</a:t>
+              <a:t>2022-11-01</a:t>
             </a:fld>
             <a:endParaRPr lang="ko-KR" altLang="en-US"/>
           </a:p>
@@ -878,7 +878,7 @@
           <a:p>
             <a:fld id="{AA62E360-6C95-4DBF-899A-1E55FFF5B26F}" type="datetimeFigureOut">
               <a:rPr lang="ko-KR" altLang="en-US" smtClean="0"/>
-              <a:t>2022-10-25</a:t>
+              <a:t>2022-11-01</a:t>
             </a:fld>
             <a:endParaRPr lang="ko-KR" altLang="en-US"/>
           </a:p>
@@ -1153,7 +1153,7 @@
           <a:p>
             <a:fld id="{AA62E360-6C95-4DBF-899A-1E55FFF5B26F}" type="datetimeFigureOut">
               <a:rPr lang="ko-KR" altLang="en-US" smtClean="0"/>
-              <a:t>2022-10-25</a:t>
+              <a:t>2022-11-01</a:t>
             </a:fld>
             <a:endParaRPr lang="ko-KR" altLang="en-US"/>
           </a:p>
@@ -1418,7 +1418,7 @@
           <a:p>
             <a:fld id="{AA62E360-6C95-4DBF-899A-1E55FFF5B26F}" type="datetimeFigureOut">
               <a:rPr lang="ko-KR" altLang="en-US" smtClean="0"/>
-              <a:t>2022-10-25</a:t>
+              <a:t>2022-11-01</a:t>
             </a:fld>
             <a:endParaRPr lang="ko-KR" altLang="en-US"/>
           </a:p>
@@ -1830,7 +1830,7 @@
           <a:p>
             <a:fld id="{AA62E360-6C95-4DBF-899A-1E55FFF5B26F}" type="datetimeFigureOut">
               <a:rPr lang="ko-KR" altLang="en-US" smtClean="0"/>
-              <a:t>2022-10-25</a:t>
+              <a:t>2022-11-01</a:t>
             </a:fld>
             <a:endParaRPr lang="ko-KR" altLang="en-US"/>
           </a:p>
@@ -1971,7 +1971,7 @@
           <a:p>
             <a:fld id="{AA62E360-6C95-4DBF-899A-1E55FFF5B26F}" type="datetimeFigureOut">
               <a:rPr lang="ko-KR" altLang="en-US" smtClean="0"/>
-              <a:t>2022-10-25</a:t>
+              <a:t>2022-11-01</a:t>
             </a:fld>
             <a:endParaRPr lang="ko-KR" altLang="en-US"/>
           </a:p>
@@ -2084,7 +2084,7 @@
           <a:p>
             <a:fld id="{AA62E360-6C95-4DBF-899A-1E55FFF5B26F}" type="datetimeFigureOut">
               <a:rPr lang="ko-KR" altLang="en-US" smtClean="0"/>
-              <a:t>2022-10-25</a:t>
+              <a:t>2022-11-01</a:t>
             </a:fld>
             <a:endParaRPr lang="ko-KR" altLang="en-US"/>
           </a:p>
@@ -2395,7 +2395,7 @@
           <a:p>
             <a:fld id="{AA62E360-6C95-4DBF-899A-1E55FFF5B26F}" type="datetimeFigureOut">
               <a:rPr lang="ko-KR" altLang="en-US" smtClean="0"/>
-              <a:t>2022-10-25</a:t>
+              <a:t>2022-11-01</a:t>
             </a:fld>
             <a:endParaRPr lang="ko-KR" altLang="en-US"/>
           </a:p>
@@ -2683,7 +2683,7 @@
           <a:p>
             <a:fld id="{AA62E360-6C95-4DBF-899A-1E55FFF5B26F}" type="datetimeFigureOut">
               <a:rPr lang="ko-KR" altLang="en-US" smtClean="0"/>
-              <a:t>2022-10-25</a:t>
+              <a:t>2022-11-01</a:t>
             </a:fld>
             <a:endParaRPr lang="ko-KR" altLang="en-US"/>
           </a:p>
@@ -2924,7 +2924,7 @@
           <a:p>
             <a:fld id="{AA62E360-6C95-4DBF-899A-1E55FFF5B26F}" type="datetimeFigureOut">
               <a:rPr lang="ko-KR" altLang="en-US" smtClean="0"/>
-              <a:t>2022-10-25</a:t>
+              <a:t>2022-11-01</a:t>
             </a:fld>
             <a:endParaRPr lang="ko-KR" altLang="en-US"/>
           </a:p>
@@ -4082,7 +4082,23 @@
           <a:p>
             <a:r>
               <a:rPr lang="en-US" altLang="ko-KR" dirty="0"/>
-              <a:t>Intensity = raw intensity</a:t>
+              <a:t>Intensity = </a:t>
+            </a:r>
+            <a:r>
+              <a:rPr lang="en-US" altLang="ko-KR" strike="sngStrike" dirty="0"/>
+              <a:t>raw intensity. </a:t>
+            </a:r>
+            <a:r>
+              <a:rPr lang="en-US" altLang="ko-KR" dirty="0"/>
+              <a:t>Total</a:t>
+            </a:r>
+            <a:r>
+              <a:rPr lang="ko-KR" altLang="en-US" dirty="0"/>
+              <a:t> </a:t>
+            </a:r>
+            <a:r>
+              <a:rPr lang="en-US" altLang="ko-KR" dirty="0"/>
+              <a:t># of photons under fitted gaussian</a:t>
             </a:r>
           </a:p>
           <a:p>
@@ -4098,7 +4114,7 @@
             </a:r>
             <a:r>
               <a:rPr lang="en-US" altLang="ko-KR" dirty="0"/>
-              <a:t> = </a:t>
+              <a:t> = Minimum intensity value</a:t>
             </a:r>
           </a:p>
           <a:p>

</xml_diff>